<commit_message>
Lesson 2 & 3
</commit_message>
<xml_diff>
--- a/Lesson 3/Lesson_3.pptx
+++ b/Lesson 3/Lesson_3.pptx
@@ -16,6 +16,13 @@
     <p:sldId id="261" r:id="rId13"/>
     <p:sldId id="262" r:id="rId14"/>
     <p:sldId id="263" r:id="rId15"/>
+    <p:sldId id="264" r:id="rId16"/>
+    <p:sldId id="265" r:id="rId17"/>
+    <p:sldId id="266" r:id="rId18"/>
+    <p:sldId id="267" r:id="rId19"/>
+    <p:sldId id="268" r:id="rId20"/>
+    <p:sldId id="269" r:id="rId21"/>
+    <p:sldId id="270" r:id="rId22"/>
   </p:sldIdLst>
   <p:sldSz cx="24384000" cy="13716000"/>
   <p:notesSz cx="6858000" cy="9144000"/>
@@ -3847,7 +3854,7 @@
         </p:blipFill>
         <p:spPr>
           <a:xfrm>
-            <a:off x="952304" y="7194421"/>
+            <a:off x="279774" y="8478341"/>
             <a:ext cx="7035801" cy="6197601"/>
           </a:xfrm>
           <a:prstGeom prst="rect">
@@ -3867,6 +3874,10 @@
           </p:nvPr>
         </p:nvSpPr>
         <p:spPr>
+          <a:xfrm>
+            <a:off x="1206499" y="12318406"/>
+            <a:ext cx="21971002" cy="636979"/>
+          </a:xfrm>
           <a:prstGeom prst="rect">
             <a:avLst/>
           </a:prstGeom>
@@ -3904,6 +3915,10 @@
           </p:nvPr>
         </p:nvSpPr>
         <p:spPr>
+          <a:xfrm>
+            <a:off x="1206498" y="2911256"/>
+            <a:ext cx="21971004" cy="4648201"/>
+          </a:xfrm>
           <a:prstGeom prst="rect">
             <a:avLst/>
           </a:prstGeom>
@@ -3928,6 +3943,10 @@
           </p:nvPr>
         </p:nvSpPr>
         <p:spPr>
+          <a:xfrm>
+            <a:off x="1206500" y="7895720"/>
+            <a:ext cx="21971000" cy="1905001"/>
+          </a:xfrm>
           <a:prstGeom prst="rect">
             <a:avLst/>
           </a:prstGeom>
@@ -3961,8 +3980,8 @@
         </p:blipFill>
         <p:spPr>
           <a:xfrm>
-            <a:off x="18348723" y="7564460"/>
-            <a:ext cx="5080001" cy="5080001"/>
+            <a:off x="18219332" y="7568148"/>
+            <a:ext cx="5768164" cy="5768164"/>
           </a:xfrm>
           <a:prstGeom prst="rect">
             <a:avLst/>
@@ -3972,6 +3991,863 @@
           </a:ln>
         </p:spPr>
       </p:pic>
+      <p:pic>
+        <p:nvPicPr>
+          <p:cNvPr id="156" name="Image" descr="Image"/>
+          <p:cNvPicPr>
+            <a:picLocks noChangeAspect="1"/>
+          </p:cNvPicPr>
+          <p:nvPr/>
+        </p:nvPicPr>
+        <p:blipFill>
+          <a:blip r:embed="rId4">
+            <a:extLst/>
+          </a:blip>
+          <a:srcRect l="0" t="0" r="0" b="16013"/>
+          <a:stretch>
+            <a:fillRect/>
+          </a:stretch>
+        </p:blipFill>
+        <p:spPr>
+          <a:xfrm>
+            <a:off x="-24860" y="-14322"/>
+            <a:ext cx="24433719" cy="5893348"/>
+          </a:xfrm>
+          <a:prstGeom prst="rect">
+            <a:avLst/>
+          </a:prstGeom>
+          <a:ln w="12700">
+            <a:miter lim="400000"/>
+          </a:ln>
+        </p:spPr>
+      </p:pic>
+    </p:spTree>
+  </p:cSld>
+  <p:clrMapOvr>
+    <a:masterClrMapping/>
+  </p:clrMapOvr>
+  <p:transition xmlns:p14="http://schemas.microsoft.com/office/powerpoint/2010/main" spd="med" advClick="1"/>
+</p:sld>
+</file>
+
+<file path=ppt/slides/slide10.xml><?xml version="1.0" encoding="utf-8"?>
+<p:sld xmlns:a="http://schemas.openxmlformats.org/drawingml/2006/main" xmlns:r="http://schemas.openxmlformats.org/officeDocument/2006/relationships" xmlns:p="http://schemas.openxmlformats.org/presentationml/2006/main" xmlns:m="http://schemas.openxmlformats.org/officeDocument/2006/math" xmlns:a14="http://schemas.microsoft.com/office/drawing/2010/main" showMasterSp="1" showMasterPhAnim="1">
+  <p:cSld>
+    <p:spTree>
+      <p:nvGrpSpPr>
+        <p:cNvPr id="1" name=""/>
+        <p:cNvGrpSpPr/>
+        <p:nvPr/>
+      </p:nvGrpSpPr>
+      <p:grpSpPr>
+        <a:xfrm>
+          <a:off x="0" y="0"/>
+          <a:ext cx="0" cy="0"/>
+          <a:chOff x="0" y="0"/>
+          <a:chExt cx="0" cy="0"/>
+        </a:xfrm>
+      </p:grpSpPr>
+      <p:pic>
+        <p:nvPicPr>
+          <p:cNvPr id="200" name="HMC5883-interfacing-with-Arduino.jpg" descr="HMC5883-interfacing-with-Arduino.jpg"/>
+          <p:cNvPicPr>
+            <a:picLocks noChangeAspect="1"/>
+          </p:cNvPicPr>
+          <p:nvPr/>
+        </p:nvPicPr>
+        <p:blipFill>
+          <a:blip r:embed="rId2">
+            <a:extLst/>
+          </a:blip>
+          <a:stretch>
+            <a:fillRect/>
+          </a:stretch>
+        </p:blipFill>
+        <p:spPr>
+          <a:xfrm>
+            <a:off x="2841688" y="1069046"/>
+            <a:ext cx="7658101" cy="5537201"/>
+          </a:xfrm>
+          <a:prstGeom prst="rect">
+            <a:avLst/>
+          </a:prstGeom>
+          <a:ln w="12700">
+            <a:miter lim="400000"/>
+          </a:ln>
+        </p:spPr>
+      </p:pic>
+      <p:pic>
+        <p:nvPicPr>
+          <p:cNvPr id="201" name="Screenshot 2021-07-30 at 10.51.39.png" descr="Screenshot 2021-07-30 at 10.51.39.png"/>
+          <p:cNvPicPr>
+            <a:picLocks noChangeAspect="1"/>
+          </p:cNvPicPr>
+          <p:nvPr/>
+        </p:nvPicPr>
+        <p:blipFill>
+          <a:blip r:embed="rId3">
+            <a:extLst/>
+          </a:blip>
+          <a:stretch>
+            <a:fillRect/>
+          </a:stretch>
+        </p:blipFill>
+        <p:spPr>
+          <a:xfrm>
+            <a:off x="1111198" y="7283731"/>
+            <a:ext cx="10291824" cy="5234774"/>
+          </a:xfrm>
+          <a:prstGeom prst="rect">
+            <a:avLst/>
+          </a:prstGeom>
+          <a:ln w="12700">
+            <a:miter lim="400000"/>
+          </a:ln>
+        </p:spPr>
+      </p:pic>
+      <p:grpSp>
+        <p:nvGrpSpPr>
+          <p:cNvPr id="204" name="Group"/>
+          <p:cNvGrpSpPr/>
+          <p:nvPr/>
+        </p:nvGrpSpPr>
+        <p:grpSpPr>
+          <a:xfrm>
+            <a:off x="11584575" y="-226666"/>
+            <a:ext cx="11077249" cy="13715387"/>
+            <a:chOff x="0" y="0"/>
+            <a:chExt cx="11077248" cy="13715386"/>
+          </a:xfrm>
+        </p:grpSpPr>
+        <p:pic>
+          <p:nvPicPr>
+            <p:cNvPr id="202" name="Screenshot 2021-07-30 at 10.50.28.png" descr="Screenshot 2021-07-30 at 10.50.28.png"/>
+            <p:cNvPicPr>
+              <a:picLocks noChangeAspect="1"/>
+            </p:cNvPicPr>
+            <p:nvPr/>
+          </p:nvPicPr>
+          <p:blipFill>
+            <a:blip r:embed="rId4">
+              <a:extLst/>
+            </a:blip>
+            <a:stretch>
+              <a:fillRect/>
+            </a:stretch>
+          </p:blipFill>
+          <p:spPr>
+            <a:xfrm>
+              <a:off x="258209" y="1072870"/>
+              <a:ext cx="10176227" cy="12642517"/>
+            </a:xfrm>
+            <a:prstGeom prst="rect">
+              <a:avLst/>
+            </a:prstGeom>
+            <a:ln w="12700" cap="flat">
+              <a:noFill/>
+              <a:miter lim="400000"/>
+            </a:ln>
+            <a:effectLst/>
+          </p:spPr>
+        </p:pic>
+        <p:sp>
+          <p:nvSpPr>
+            <p:cNvPr id="203" name="Rectangle"/>
+            <p:cNvSpPr/>
+            <p:nvPr/>
+          </p:nvSpPr>
+          <p:spPr>
+            <a:xfrm>
+              <a:off x="0" y="0"/>
+              <a:ext cx="11077249" cy="1129177"/>
+            </a:xfrm>
+            <a:prstGeom prst="rect">
+              <a:avLst/>
+            </a:prstGeom>
+            <a:solidFill>
+              <a:srgbClr val="FEFEFE"/>
+            </a:solidFill>
+            <a:ln w="12700" cap="flat">
+              <a:noFill/>
+              <a:miter lim="400000"/>
+            </a:ln>
+            <a:effectLst/>
+          </p:spPr>
+          <p:txBody>
+            <a:bodyPr wrap="square" lIns="50800" tIns="50800" rIns="50800" bIns="50800" numCol="1" anchor="ctr">
+              <a:noAutofit/>
+            </a:bodyPr>
+            <a:lstStyle/>
+            <a:p>
+              <a:pPr defTabSz="825500">
+                <a:defRPr sz="3200">
+                  <a:solidFill>
+                    <a:srgbClr val="FFFFFF"/>
+                  </a:solidFill>
+                  <a:latin typeface="Helvetica Neue Medium"/>
+                  <a:ea typeface="Helvetica Neue Medium"/>
+                  <a:cs typeface="Helvetica Neue Medium"/>
+                  <a:sym typeface="Helvetica Neue Medium"/>
+                </a:defRPr>
+              </a:pPr>
+            </a:p>
+          </p:txBody>
+        </p:sp>
+      </p:grpSp>
+    </p:spTree>
+  </p:cSld>
+  <p:clrMapOvr>
+    <a:masterClrMapping/>
+  </p:clrMapOvr>
+  <p:transition xmlns:p14="http://schemas.microsoft.com/office/powerpoint/2010/main" spd="med" advClick="1"/>
+</p:sld>
+</file>
+
+<file path=ppt/slides/slide11.xml><?xml version="1.0" encoding="utf-8"?>
+<p:sld xmlns:a="http://schemas.openxmlformats.org/drawingml/2006/main" xmlns:r="http://schemas.openxmlformats.org/officeDocument/2006/relationships" xmlns:p="http://schemas.openxmlformats.org/presentationml/2006/main" xmlns:m="http://schemas.openxmlformats.org/officeDocument/2006/math" xmlns:a14="http://schemas.microsoft.com/office/drawing/2010/main" showMasterSp="1" showMasterPhAnim="1">
+  <p:cSld>
+    <p:spTree>
+      <p:nvGrpSpPr>
+        <p:cNvPr id="1" name=""/>
+        <p:cNvGrpSpPr/>
+        <p:nvPr/>
+      </p:nvGrpSpPr>
+      <p:grpSpPr>
+        <a:xfrm>
+          <a:off x="0" y="0"/>
+          <a:ext cx="0" cy="0"/>
+          <a:chOff x="0" y="0"/>
+          <a:chExt cx="0" cy="0"/>
+        </a:xfrm>
+      </p:grpSpPr>
+      <p:sp>
+        <p:nvSpPr>
+          <p:cNvPr id="206" name="SPI"/>
+          <p:cNvSpPr txBox="1"/>
+          <p:nvPr/>
+        </p:nvSpPr>
+        <p:spPr>
+          <a:xfrm>
+            <a:off x="1339815" y="1277681"/>
+            <a:ext cx="1788605" cy="1378388"/>
+          </a:xfrm>
+          <a:prstGeom prst="rect">
+            <a:avLst/>
+          </a:prstGeom>
+          <a:ln w="12700">
+            <a:miter lim="400000"/>
+          </a:ln>
+          <a:extLst>
+            <a:ext uri="{C572A759-6A51-4108-AA02-DFA0A04FC94B}">
+              <ma14:wrappingTextBoxFlag xmlns:ma14="http://schemas.microsoft.com/office/mac/drawingml/2011/main" val="1"/>
+            </a:ext>
+          </a:extLst>
+        </p:spPr>
+        <p:txBody>
+          <a:bodyPr wrap="none" lIns="50800" tIns="50800" rIns="50800" bIns="50800" anchor="ctr">
+            <a:spAutoFit/>
+          </a:bodyPr>
+          <a:lstStyle>
+            <a:lvl1pPr algn="l">
+              <a:lnSpc>
+                <a:spcPct val="80000"/>
+              </a:lnSpc>
+              <a:defRPr b="1" spc="-170" sz="8500">
+                <a:solidFill>
+                  <a:srgbClr val="EFCF0A"/>
+                </a:solidFill>
+              </a:defRPr>
+            </a:lvl1pPr>
+          </a:lstStyle>
+          <a:p>
+            <a:pPr/>
+            <a:r>
+              <a:t>SPI</a:t>
+            </a:r>
+          </a:p>
+        </p:txBody>
+      </p:sp>
+      <p:sp>
+        <p:nvSpPr>
+          <p:cNvPr id="207" name="Послідовний синхронний інтерфейс передачі даних.…"/>
+          <p:cNvSpPr txBox="1"/>
+          <p:nvPr/>
+        </p:nvSpPr>
+        <p:spPr>
+          <a:xfrm>
+            <a:off x="1286461" y="4350607"/>
+            <a:ext cx="12943889" cy="5870734"/>
+          </a:xfrm>
+          <a:prstGeom prst="rect">
+            <a:avLst/>
+          </a:prstGeom>
+          <a:ln w="12700">
+            <a:miter lim="400000"/>
+          </a:ln>
+          <a:extLst>
+            <a:ext uri="{C572A759-6A51-4108-AA02-DFA0A04FC94B}">
+              <ma14:wrappingTextBoxFlag xmlns:ma14="http://schemas.microsoft.com/office/mac/drawingml/2011/main" val="1"/>
+            </a:ext>
+          </a:extLst>
+        </p:spPr>
+        <p:txBody>
+          <a:bodyPr lIns="50800" tIns="50800" rIns="50800" bIns="50800" anchor="ctr">
+            <a:spAutoFit/>
+          </a:bodyPr>
+          <a:lstStyle/>
+          <a:p>
+            <a:pPr marL="609600" indent="-609600" algn="l">
+              <a:lnSpc>
+                <a:spcPct val="90000"/>
+              </a:lnSpc>
+              <a:spcBef>
+                <a:spcPts val="4500"/>
+              </a:spcBef>
+              <a:buSzPct val="123000"/>
+              <a:buChar char="•"/>
+              <a:defRPr sz="4800">
+                <a:solidFill>
+                  <a:srgbClr val="000000"/>
+                </a:solidFill>
+              </a:defRPr>
+            </a:pPr>
+            <a:r>
+              <a:t>Послідовний синхронний інтерфейс передачі даних.</a:t>
+            </a:r>
+          </a:p>
+          <a:p>
+            <a:pPr marL="609600" indent="-609600" algn="l">
+              <a:lnSpc>
+                <a:spcPct val="90000"/>
+              </a:lnSpc>
+              <a:spcBef>
+                <a:spcPts val="4500"/>
+              </a:spcBef>
+              <a:buSzPct val="123000"/>
+              <a:buChar char="•"/>
+              <a:defRPr sz="4800">
+                <a:solidFill>
+                  <a:srgbClr val="000000"/>
+                </a:solidFill>
+              </a:defRPr>
+            </a:pPr>
+            <a:r>
+              <a:t>Як головний, так і підлеглий можуть надсилати дані одночасно</a:t>
+            </a:r>
+          </a:p>
+          <a:p>
+            <a:pPr marL="609600" indent="-609600" algn="l">
+              <a:lnSpc>
+                <a:spcPct val="90000"/>
+              </a:lnSpc>
+              <a:spcBef>
+                <a:spcPts val="4500"/>
+              </a:spcBef>
+              <a:buSzPct val="123000"/>
+              <a:buChar char="•"/>
+              <a:defRPr sz="4800">
+                <a:solidFill>
+                  <a:srgbClr val="000000"/>
+                </a:solidFill>
+              </a:defRPr>
+            </a:pPr>
+            <a:r>
+              <a:t>Пристрої SPI підтримують набагато вищі тактові частоти порівняно з інтерфейсами I2C</a:t>
+            </a:r>
+          </a:p>
+        </p:txBody>
+      </p:sp>
+      <p:pic>
+        <p:nvPicPr>
+          <p:cNvPr id="208" name="Image" descr="Image"/>
+          <p:cNvPicPr>
+            <a:picLocks noChangeAspect="1"/>
+          </p:cNvPicPr>
+          <p:nvPr/>
+        </p:nvPicPr>
+        <p:blipFill>
+          <a:blip r:embed="rId2">
+            <a:extLst/>
+          </a:blip>
+          <a:stretch>
+            <a:fillRect/>
+          </a:stretch>
+        </p:blipFill>
+        <p:spPr>
+          <a:xfrm>
+            <a:off x="15454796" y="3346450"/>
+            <a:ext cx="8331201" cy="7023100"/>
+          </a:xfrm>
+          <a:prstGeom prst="rect">
+            <a:avLst/>
+          </a:prstGeom>
+          <a:ln w="12700">
+            <a:miter lim="400000"/>
+          </a:ln>
+        </p:spPr>
+      </p:pic>
+    </p:spTree>
+  </p:cSld>
+  <p:clrMapOvr>
+    <a:masterClrMapping/>
+  </p:clrMapOvr>
+  <p:transition xmlns:p14="http://schemas.microsoft.com/office/powerpoint/2010/main" spd="med" advClick="1"/>
+</p:sld>
+</file>
+
+<file path=ppt/slides/slide12.xml><?xml version="1.0" encoding="utf-8"?>
+<p:sld xmlns:a="http://schemas.openxmlformats.org/drawingml/2006/main" xmlns:r="http://schemas.openxmlformats.org/officeDocument/2006/relationships" xmlns:p="http://schemas.openxmlformats.org/presentationml/2006/main" xmlns:m="http://schemas.openxmlformats.org/officeDocument/2006/math" xmlns:a14="http://schemas.microsoft.com/office/drawing/2010/main" showMasterSp="1" showMasterPhAnim="1">
+  <p:cSld>
+    <p:spTree>
+      <p:nvGrpSpPr>
+        <p:cNvPr id="1" name=""/>
+        <p:cNvGrpSpPr/>
+        <p:nvPr/>
+      </p:nvGrpSpPr>
+      <p:grpSpPr>
+        <a:xfrm>
+          <a:off x="0" y="0"/>
+          <a:ext cx="0" cy="0"/>
+          <a:chOff x="0" y="0"/>
+          <a:chExt cx="0" cy="0"/>
+        </a:xfrm>
+      </p:grpSpPr>
+      <p:sp>
+        <p:nvSpPr>
+          <p:cNvPr id="210" name="MISO (Master In Slave Out) - надсилання даних ведучому (Master мікроконтролеру)…"/>
+          <p:cNvSpPr txBox="1"/>
+          <p:nvPr/>
+        </p:nvSpPr>
+        <p:spPr>
+          <a:xfrm>
+            <a:off x="1075554" y="2003841"/>
+            <a:ext cx="12215738" cy="9708318"/>
+          </a:xfrm>
+          <a:prstGeom prst="rect">
+            <a:avLst/>
+          </a:prstGeom>
+          <a:ln w="12700">
+            <a:miter lim="400000"/>
+          </a:ln>
+          <a:extLst>
+            <a:ext uri="{C572A759-6A51-4108-AA02-DFA0A04FC94B}">
+              <ma14:wrappingTextBoxFlag xmlns:ma14="http://schemas.microsoft.com/office/mac/drawingml/2011/main" val="1"/>
+            </a:ext>
+          </a:extLst>
+        </p:spPr>
+        <p:txBody>
+          <a:bodyPr lIns="50800" tIns="50800" rIns="50800" bIns="50800" anchor="ctr">
+            <a:spAutoFit/>
+          </a:bodyPr>
+          <a:lstStyle/>
+          <a:p>
+            <a:pPr algn="l">
+              <a:lnSpc>
+                <a:spcPct val="90000"/>
+              </a:lnSpc>
+              <a:spcBef>
+                <a:spcPts val="4500"/>
+              </a:spcBef>
+              <a:defRPr sz="4800">
+                <a:solidFill>
+                  <a:srgbClr val="000000"/>
+                </a:solidFill>
+              </a:defRPr>
+            </a:pPr>
+            <a:r>
+              <a:rPr>
+                <a:solidFill>
+                  <a:srgbClr val="EFCF0A"/>
+                </a:solidFill>
+              </a:rPr>
+              <a:t>MISO</a:t>
+            </a:r>
+            <a:r>
+              <a:t> (Master In Slave Out) - надсилання даних ведучому (Master мікроконтролеру)</a:t>
+            </a:r>
+          </a:p>
+          <a:p>
+            <a:pPr algn="l">
+              <a:lnSpc>
+                <a:spcPct val="90000"/>
+              </a:lnSpc>
+              <a:spcBef>
+                <a:spcPts val="4500"/>
+              </a:spcBef>
+              <a:defRPr sz="4800">
+                <a:solidFill>
+                  <a:srgbClr val="000000"/>
+                </a:solidFill>
+              </a:defRPr>
+            </a:pPr>
+            <a:r>
+              <a:rPr>
+                <a:solidFill>
+                  <a:srgbClr val="EFCF0A"/>
+                </a:solidFill>
+              </a:rPr>
+              <a:t>MOSI</a:t>
+            </a:r>
+            <a:r>
+              <a:t> (Master Out Slave In) - головна лінія для відправки даних на периферію (сенсорам)</a:t>
+            </a:r>
+          </a:p>
+          <a:p>
+            <a:pPr algn="l">
+              <a:lnSpc>
+                <a:spcPct val="90000"/>
+              </a:lnSpc>
+              <a:spcBef>
+                <a:spcPts val="4500"/>
+              </a:spcBef>
+              <a:defRPr sz="4800">
+                <a:solidFill>
+                  <a:srgbClr val="000000"/>
+                </a:solidFill>
+              </a:defRPr>
+            </a:pPr>
+            <a:r>
+              <a:rPr>
+                <a:solidFill>
+                  <a:srgbClr val="EFCF0A"/>
+                </a:solidFill>
+              </a:rPr>
+              <a:t>SCK</a:t>
+            </a:r>
+            <a:r>
+              <a:t> (послідовний годинник) - тактові імпульси, які синхронізують передачу даних, що генерується ведучим</a:t>
+            </a:r>
+          </a:p>
+          <a:p>
+            <a:pPr algn="l">
+              <a:lnSpc>
+                <a:spcPct val="90000"/>
+              </a:lnSpc>
+              <a:spcBef>
+                <a:spcPts val="4500"/>
+              </a:spcBef>
+              <a:defRPr sz="4800">
+                <a:solidFill>
+                  <a:srgbClr val="000000"/>
+                </a:solidFill>
+              </a:defRPr>
+            </a:pPr>
+            <a:r>
+              <a:rPr>
+                <a:solidFill>
+                  <a:srgbClr val="EFCF0A"/>
+                </a:solidFill>
+              </a:rPr>
+              <a:t>SS</a:t>
+            </a:r>
+            <a:r>
+              <a:t> (Slave Select) - по одному для кожного Slave; Використовуються Master-ом для вибору пристрою, з яким він хоче взаємодіяти.</a:t>
+            </a:r>
+          </a:p>
+        </p:txBody>
+      </p:sp>
+      <p:pic>
+        <p:nvPicPr>
+          <p:cNvPr id="211" name="Image" descr="Image"/>
+          <p:cNvPicPr>
+            <a:picLocks noChangeAspect="1"/>
+          </p:cNvPicPr>
+          <p:nvPr/>
+        </p:nvPicPr>
+        <p:blipFill>
+          <a:blip r:embed="rId2">
+            <a:extLst/>
+          </a:blip>
+          <a:stretch>
+            <a:fillRect/>
+          </a:stretch>
+        </p:blipFill>
+        <p:spPr>
+          <a:xfrm>
+            <a:off x="13446236" y="3238454"/>
+            <a:ext cx="9643966" cy="7650880"/>
+          </a:xfrm>
+          <a:prstGeom prst="rect">
+            <a:avLst/>
+          </a:prstGeom>
+          <a:ln w="12700">
+            <a:miter lim="400000"/>
+          </a:ln>
+        </p:spPr>
+      </p:pic>
+    </p:spTree>
+  </p:cSld>
+  <p:clrMapOvr>
+    <a:masterClrMapping/>
+  </p:clrMapOvr>
+  <p:transition xmlns:p14="http://schemas.microsoft.com/office/powerpoint/2010/main" spd="med" advClick="1"/>
+</p:sld>
+</file>
+
+<file path=ppt/slides/slide13.xml><?xml version="1.0" encoding="utf-8"?>
+<p:sld xmlns:a="http://schemas.openxmlformats.org/drawingml/2006/main" xmlns:r="http://schemas.openxmlformats.org/officeDocument/2006/relationships" xmlns:p="http://schemas.openxmlformats.org/presentationml/2006/main" xmlns:m="http://schemas.openxmlformats.org/officeDocument/2006/math" xmlns:a14="http://schemas.microsoft.com/office/drawing/2010/main" showMasterSp="1" showMasterPhAnim="1">
+  <p:cSld>
+    <p:spTree>
+      <p:nvGrpSpPr>
+        <p:cNvPr id="1" name=""/>
+        <p:cNvGrpSpPr/>
+        <p:nvPr/>
+      </p:nvGrpSpPr>
+      <p:grpSpPr>
+        <a:xfrm>
+          <a:off x="0" y="0"/>
+          <a:ext cx="0" cy="0"/>
+          <a:chOff x="0" y="0"/>
+          <a:chExt cx="0" cy="0"/>
+        </a:xfrm>
+      </p:grpSpPr>
+      <p:pic>
+        <p:nvPicPr>
+          <p:cNvPr id="213" name="Image" descr="Image"/>
+          <p:cNvPicPr>
+            <a:picLocks noChangeAspect="1"/>
+          </p:cNvPicPr>
+          <p:nvPr/>
+        </p:nvPicPr>
+        <p:blipFill>
+          <a:blip r:embed="rId2">
+            <a:extLst/>
+          </a:blip>
+          <a:stretch>
+            <a:fillRect/>
+          </a:stretch>
+        </p:blipFill>
+        <p:spPr>
+          <a:xfrm>
+            <a:off x="3187100" y="3998176"/>
+            <a:ext cx="18009800" cy="5719649"/>
+          </a:xfrm>
+          <a:prstGeom prst="rect">
+            <a:avLst/>
+          </a:prstGeom>
+          <a:ln w="12700">
+            <a:miter lim="400000"/>
+          </a:ln>
+        </p:spPr>
+      </p:pic>
+    </p:spTree>
+  </p:cSld>
+  <p:clrMapOvr>
+    <a:masterClrMapping/>
+  </p:clrMapOvr>
+  <p:transition xmlns:p14="http://schemas.microsoft.com/office/powerpoint/2010/main" spd="med" advClick="1"/>
+</p:sld>
+</file>
+
+<file path=ppt/slides/slide14.xml><?xml version="1.0" encoding="utf-8"?>
+<p:sld xmlns:a="http://schemas.openxmlformats.org/drawingml/2006/main" xmlns:r="http://schemas.openxmlformats.org/officeDocument/2006/relationships" xmlns:p="http://schemas.openxmlformats.org/presentationml/2006/main" xmlns:m="http://schemas.openxmlformats.org/officeDocument/2006/math" xmlns:a14="http://schemas.microsoft.com/office/drawing/2010/main" showMasterSp="1" showMasterPhAnim="1">
+  <p:cSld>
+    <p:spTree>
+      <p:nvGrpSpPr>
+        <p:cNvPr id="1" name=""/>
+        <p:cNvGrpSpPr/>
+        <p:nvPr/>
+      </p:nvGrpSpPr>
+      <p:grpSpPr>
+        <a:xfrm>
+          <a:off x="0" y="0"/>
+          <a:ext cx="0" cy="0"/>
+          <a:chOff x="0" y="0"/>
+          <a:chExt cx="0" cy="0"/>
+        </a:xfrm>
+      </p:grpSpPr>
+      <p:pic>
+        <p:nvPicPr>
+          <p:cNvPr id="215" name="Image" descr="Image"/>
+          <p:cNvPicPr>
+            <a:picLocks noChangeAspect="1"/>
+          </p:cNvPicPr>
+          <p:nvPr/>
+        </p:nvPicPr>
+        <p:blipFill>
+          <a:blip r:embed="rId2">
+            <a:extLst/>
+          </a:blip>
+          <a:stretch>
+            <a:fillRect/>
+          </a:stretch>
+        </p:blipFill>
+        <p:spPr>
+          <a:xfrm>
+            <a:off x="5819571" y="1581150"/>
+            <a:ext cx="13906501" cy="10553700"/>
+          </a:xfrm>
+          <a:prstGeom prst="rect">
+            <a:avLst/>
+          </a:prstGeom>
+          <a:ln w="12700">
+            <a:miter lim="400000"/>
+          </a:ln>
+        </p:spPr>
+      </p:pic>
+    </p:spTree>
+  </p:cSld>
+  <p:clrMapOvr>
+    <a:masterClrMapping/>
+  </p:clrMapOvr>
+  <p:transition xmlns:p14="http://schemas.microsoft.com/office/powerpoint/2010/main" spd="med" advClick="1"/>
+</p:sld>
+</file>
+
+<file path=ppt/slides/slide15.xml><?xml version="1.0" encoding="utf-8"?>
+<p:sld xmlns:a="http://schemas.openxmlformats.org/drawingml/2006/main" xmlns:r="http://schemas.openxmlformats.org/officeDocument/2006/relationships" xmlns:p="http://schemas.openxmlformats.org/presentationml/2006/main" xmlns:m="http://schemas.openxmlformats.org/officeDocument/2006/math" xmlns:a14="http://schemas.microsoft.com/office/drawing/2010/main" showMasterSp="1" showMasterPhAnim="1">
+  <p:cSld>
+    <p:spTree>
+      <p:nvGrpSpPr>
+        <p:cNvPr id="1" name=""/>
+        <p:cNvGrpSpPr/>
+        <p:nvPr/>
+      </p:nvGrpSpPr>
+      <p:grpSpPr>
+        <a:xfrm>
+          <a:off x="0" y="0"/>
+          <a:ext cx="0" cy="0"/>
+          <a:chOff x="0" y="0"/>
+          <a:chExt cx="0" cy="0"/>
+        </a:xfrm>
+      </p:grpSpPr>
+      <p:sp>
+        <p:nvSpPr>
+          <p:cNvPr id="217" name="HW"/>
+          <p:cNvSpPr txBox="1"/>
+          <p:nvPr/>
+        </p:nvSpPr>
+        <p:spPr>
+          <a:xfrm>
+            <a:off x="1498600" y="1437416"/>
+            <a:ext cx="2537715" cy="1849568"/>
+          </a:xfrm>
+          <a:prstGeom prst="rect">
+            <a:avLst/>
+          </a:prstGeom>
+          <a:ln w="12700">
+            <a:miter lim="400000"/>
+          </a:ln>
+          <a:extLst>
+            <a:ext uri="{C572A759-6A51-4108-AA02-DFA0A04FC94B}">
+              <ma14:wrappingTextBoxFlag xmlns:ma14="http://schemas.microsoft.com/office/mac/drawingml/2011/main" val="1"/>
+            </a:ext>
+          </a:extLst>
+        </p:spPr>
+        <p:txBody>
+          <a:bodyPr wrap="none" lIns="50800" tIns="50800" rIns="50800" bIns="50800" anchor="ctr">
+            <a:spAutoFit/>
+          </a:bodyPr>
+          <a:lstStyle>
+            <a:lvl1pPr algn="l">
+              <a:lnSpc>
+                <a:spcPct val="80000"/>
+              </a:lnSpc>
+              <a:defRPr b="1" spc="-232" sz="11600">
+                <a:solidFill>
+                  <a:srgbClr val="EFCF0A"/>
+                </a:solidFill>
+              </a:defRPr>
+            </a:lvl1pPr>
+          </a:lstStyle>
+          <a:p>
+            <a:pPr/>
+            <a:r>
+              <a:t>HW</a:t>
+            </a:r>
+          </a:p>
+        </p:txBody>
+      </p:sp>
+      <p:sp>
+        <p:nvSpPr>
+          <p:cNvPr id="218" name="Підключити матрицю по I2C, вивести сердчеко на ній…"/>
+          <p:cNvSpPr txBox="1"/>
+          <p:nvPr/>
+        </p:nvSpPr>
+        <p:spPr>
+          <a:xfrm>
+            <a:off x="1865832" y="3813850"/>
+            <a:ext cx="20140688" cy="4564300"/>
+          </a:xfrm>
+          <a:prstGeom prst="rect">
+            <a:avLst/>
+          </a:prstGeom>
+          <a:ln w="12700">
+            <a:miter lim="400000"/>
+          </a:ln>
+          <a:extLst>
+            <a:ext uri="{C572A759-6A51-4108-AA02-DFA0A04FC94B}">
+              <ma14:wrappingTextBoxFlag xmlns:ma14="http://schemas.microsoft.com/office/mac/drawingml/2011/main" val="1"/>
+            </a:ext>
+          </a:extLst>
+        </p:spPr>
+        <p:txBody>
+          <a:bodyPr lIns="50800" tIns="50800" rIns="50800" bIns="50800" anchor="ctr">
+            <a:spAutoFit/>
+          </a:bodyPr>
+          <a:lstStyle/>
+          <a:p>
+            <a:pPr marL="609600" indent="-609600" algn="l">
+              <a:lnSpc>
+                <a:spcPct val="90000"/>
+              </a:lnSpc>
+              <a:spcBef>
+                <a:spcPts val="4500"/>
+              </a:spcBef>
+              <a:buSzPct val="123000"/>
+              <a:buChar char="•"/>
+              <a:defRPr sz="4800">
+                <a:solidFill>
+                  <a:srgbClr val="000000"/>
+                </a:solidFill>
+              </a:defRPr>
+            </a:pPr>
+            <a:r>
+              <a:t>Підключити матрицю по I2C, вивести сердчеко на ній</a:t>
+            </a:r>
+          </a:p>
+          <a:p>
+            <a:pPr marL="609600" indent="-609600" algn="l">
+              <a:lnSpc>
+                <a:spcPct val="90000"/>
+              </a:lnSpc>
+              <a:spcBef>
+                <a:spcPts val="4500"/>
+              </a:spcBef>
+              <a:buSzPct val="123000"/>
+              <a:buChar char="•"/>
+              <a:defRPr sz="4800">
+                <a:solidFill>
+                  <a:srgbClr val="000000"/>
+                </a:solidFill>
+              </a:defRPr>
+            </a:pPr>
+            <a:r>
+              <a:t>Об’єднатись в команди та змусити дві ардуїнки “заговорити”</a:t>
+            </a:r>
+          </a:p>
+          <a:p>
+            <a:pPr lvl="1" marL="1219200" indent="-609600" algn="l">
+              <a:lnSpc>
+                <a:spcPct val="90000"/>
+              </a:lnSpc>
+              <a:spcBef>
+                <a:spcPts val="4500"/>
+              </a:spcBef>
+              <a:buSzPct val="123000"/>
+              <a:buChar char="•"/>
+              <a:defRPr sz="4800">
+                <a:solidFill>
+                  <a:srgbClr val="000000"/>
+                </a:solidFill>
+              </a:defRPr>
+            </a:pPr>
+            <a:r>
+              <a:t>Вітається креатив! Приклад: одна з ардуїнок працюватиме з пристроями керування: потенціометр, кнопка тощо; інша виводить щось на матрицю; взаємодія між ардуїнками - UART</a:t>
+            </a:r>
+          </a:p>
+        </p:txBody>
+      </p:sp>
     </p:spTree>
   </p:cSld>
   <p:clrMapOvr>
@@ -4000,7 +4876,7 @@
       </p:grpSpPr>
       <p:pic>
         <p:nvPicPr>
-          <p:cNvPr id="157" name="H4-T0t9SjSh3Z7VfvnVj4joTB2pAiTAsZQujqC0-1cgr8l2H1vt7PwLai0dS4kPoRvBKnKKaKt1CYzNaK-2_8_2pX5wOPcJrJOVPgUhrs9gaPoDIRIdDP9uVK41BwAhxEsRa5Cryf9U.png" descr="H4-T0t9SjSh3Z7VfvnVj4joTB2pAiTAsZQujqC0-1cgr8l2H1vt7PwLai0dS4kPoRvBKnKKaKt1CYzNaK-2_8_2pX5wOPcJrJOVPgUhrs9gaPoDIRIdDP9uVK41BwAhxEsRa5Cryf9U.png"/>
+          <p:cNvPr id="158" name="H4-T0t9SjSh3Z7VfvnVj4joTB2pAiTAsZQujqC0-1cgr8l2H1vt7PwLai0dS4kPoRvBKnKKaKt1CYzNaK-2_8_2pX5wOPcJrJOVPgUhrs9gaPoDIRIdDP9uVK41BwAhxEsRa5Cryf9U.png" descr="H4-T0t9SjSh3Z7VfvnVj4joTB2pAiTAsZQujqC0-1cgr8l2H1vt7PwLai0dS4kPoRvBKnKKaKt1CYzNaK-2_8_2pX5wOPcJrJOVPgUhrs9gaPoDIRIdDP9uVK41BwAhxEsRa5Cryf9U.png"/>
           <p:cNvPicPr>
             <a:picLocks noChangeAspect="1"/>
           </p:cNvPicPr>
@@ -4029,14 +4905,14 @@
       </p:pic>
       <p:sp>
         <p:nvSpPr>
-          <p:cNvPr id="158" name="Rectangle"/>
+          <p:cNvPr id="159" name="Rectangle"/>
           <p:cNvSpPr/>
           <p:nvPr/>
         </p:nvSpPr>
         <p:spPr>
           <a:xfrm>
-            <a:off x="15263234" y="4241799"/>
-            <a:ext cx="769295" cy="1541063"/>
+            <a:off x="15263234" y="4241800"/>
+            <a:ext cx="769295" cy="1541062"/>
           </a:xfrm>
           <a:prstGeom prst="rect">
             <a:avLst/>
@@ -4068,7 +4944,7 @@
       </p:sp>
       <p:sp>
         <p:nvSpPr>
-          <p:cNvPr id="159" name="Pins for common…"/>
+          <p:cNvPr id="160" name="Pins for common…"/>
           <p:cNvSpPr txBox="1"/>
           <p:nvPr/>
         </p:nvSpPr>
@@ -4128,7 +5004,7 @@
       </p:sp>
       <p:sp>
         <p:nvSpPr>
-          <p:cNvPr id="160" name="Rectangle"/>
+          <p:cNvPr id="161" name="Rectangle"/>
           <p:cNvSpPr/>
           <p:nvPr/>
         </p:nvSpPr>
@@ -4193,7 +5069,7 @@
       </p:grpSpPr>
       <p:pic>
         <p:nvPicPr>
-          <p:cNvPr id="162" name="Image" descr="Image"/>
+          <p:cNvPr id="163" name="Image" descr="Image"/>
           <p:cNvPicPr>
             <a:picLocks noChangeAspect="1"/>
           </p:cNvPicPr>
@@ -4210,7 +5086,7 @@
         </p:blipFill>
         <p:spPr>
           <a:xfrm>
-            <a:off x="4962027" y="5142293"/>
+            <a:off x="4961929" y="8412450"/>
             <a:ext cx="14459946" cy="3431414"/>
           </a:xfrm>
           <a:prstGeom prst="rect">
@@ -4221,6 +5097,174 @@
           </a:ln>
         </p:spPr>
       </p:pic>
+      <p:sp>
+        <p:nvSpPr>
+          <p:cNvPr id="164" name="Потребує кілька ліній для передачі даних…"/>
+          <p:cNvSpPr txBox="1"/>
+          <p:nvPr/>
+        </p:nvSpPr>
+        <p:spPr>
+          <a:xfrm>
+            <a:off x="956297" y="2626162"/>
+            <a:ext cx="12613540" cy="4482583"/>
+          </a:xfrm>
+          <a:prstGeom prst="rect">
+            <a:avLst/>
+          </a:prstGeom>
+          <a:ln w="12700">
+            <a:miter lim="400000"/>
+          </a:ln>
+          <a:extLst>
+            <a:ext uri="{C572A759-6A51-4108-AA02-DFA0A04FC94B}">
+              <ma14:wrappingTextBoxFlag xmlns:ma14="http://schemas.microsoft.com/office/mac/drawingml/2011/main" val="1"/>
+            </a:ext>
+          </a:extLst>
+        </p:spPr>
+        <p:txBody>
+          <a:bodyPr wrap="none" lIns="50800" tIns="50800" rIns="50800" bIns="50800" anchor="ctr">
+            <a:spAutoFit/>
+          </a:bodyPr>
+          <a:lstStyle/>
+          <a:p>
+            <a:pPr marL="609600" indent="-609600" algn="l">
+              <a:lnSpc>
+                <a:spcPct val="90000"/>
+              </a:lnSpc>
+              <a:spcBef>
+                <a:spcPts val="4500"/>
+              </a:spcBef>
+              <a:buSzPct val="123000"/>
+              <a:buChar char="•"/>
+              <a:defRPr sz="4800">
+                <a:solidFill>
+                  <a:srgbClr val="000000"/>
+                </a:solidFill>
+              </a:defRPr>
+            </a:pPr>
+            <a:r>
+              <a:t>Потребує кілька ліній для передачі даних</a:t>
+            </a:r>
+          </a:p>
+          <a:p>
+            <a:pPr marL="609600" indent="-609600" algn="l">
+              <a:lnSpc>
+                <a:spcPct val="90000"/>
+              </a:lnSpc>
+              <a:spcBef>
+                <a:spcPts val="4500"/>
+              </a:spcBef>
+              <a:buSzPct val="123000"/>
+              <a:buChar char="•"/>
+              <a:defRPr sz="4800">
+                <a:solidFill>
+                  <a:srgbClr val="000000"/>
+                </a:solidFill>
+              </a:defRPr>
+            </a:pPr>
+            <a:r>
+              <a:t>Швидка передача даних</a:t>
+            </a:r>
+          </a:p>
+          <a:p>
+            <a:pPr marL="609600" indent="-609600" algn="l">
+              <a:lnSpc>
+                <a:spcPct val="90000"/>
+              </a:lnSpc>
+              <a:spcBef>
+                <a:spcPts val="4500"/>
+              </a:spcBef>
+              <a:buSzPct val="123000"/>
+              <a:buChar char="•"/>
+              <a:defRPr sz="4800">
+                <a:solidFill>
+                  <a:srgbClr val="000000"/>
+                </a:solidFill>
+              </a:defRPr>
+            </a:pPr>
+            <a:r>
+              <a:t>Дорога</a:t>
+            </a:r>
+          </a:p>
+          <a:p>
+            <a:pPr marL="609600" indent="-609600" algn="l">
+              <a:lnSpc>
+                <a:spcPct val="90000"/>
+              </a:lnSpc>
+              <a:spcBef>
+                <a:spcPts val="4500"/>
+              </a:spcBef>
+              <a:buSzPct val="123000"/>
+              <a:buChar char="•"/>
+              <a:defRPr sz="4800">
+                <a:solidFill>
+                  <a:srgbClr val="000000"/>
+                </a:solidFill>
+              </a:defRPr>
+            </a:pPr>
+            <a:r>
+              <a:t>Використовується на коротких відстанях</a:t>
+            </a:r>
+          </a:p>
+        </p:txBody>
+      </p:sp>
+      <p:sp>
+        <p:nvSpPr>
+          <p:cNvPr id="165" name="Паралельна передача даних"/>
+          <p:cNvSpPr txBox="1"/>
+          <p:nvPr/>
+        </p:nvSpPr>
+        <p:spPr>
+          <a:xfrm>
+            <a:off x="722752" y="789634"/>
+            <a:ext cx="14849476" cy="1378388"/>
+          </a:xfrm>
+          <a:prstGeom prst="rect">
+            <a:avLst/>
+          </a:prstGeom>
+          <a:ln w="12700">
+            <a:miter lim="400000"/>
+          </a:ln>
+          <a:extLst>
+            <a:ext uri="{C572A759-6A51-4108-AA02-DFA0A04FC94B}">
+              <ma14:wrappingTextBoxFlag xmlns:ma14="http://schemas.microsoft.com/office/mac/drawingml/2011/main" val="1"/>
+            </a:ext>
+          </a:extLst>
+        </p:spPr>
+        <p:txBody>
+          <a:bodyPr wrap="none" lIns="50800" tIns="50800" rIns="50800" bIns="50800" anchor="ctr">
+            <a:spAutoFit/>
+          </a:bodyPr>
+          <a:lstStyle>
+            <a:lvl1pPr algn="l">
+              <a:lnSpc>
+                <a:spcPct val="80000"/>
+              </a:lnSpc>
+              <a:defRPr b="1" spc="-170" sz="8500">
+                <a:solidFill>
+                  <a:srgbClr val="EFCF0A"/>
+                </a:solidFill>
+              </a:defRPr>
+            </a:lvl1pPr>
+          </a:lstStyle>
+          <a:p>
+            <a:pPr>
+              <a:defRPr>
+                <a:solidFill>
+                  <a:srgbClr val="000000"/>
+                </a:solidFill>
+              </a:defRPr>
+            </a:pPr>
+            <a:r>
+              <a:rPr>
+                <a:solidFill>
+                  <a:srgbClr val="EFCF0A"/>
+                </a:solidFill>
+              </a:rPr>
+              <a:t>Паралельна передача даних</a:t>
+            </a:r>
+          </a:p>
+        </p:txBody>
+      </p:sp>
     </p:spTree>
   </p:cSld>
   <p:clrMapOvr>
@@ -4249,7 +5293,7 @@
       </p:grpSpPr>
       <p:pic>
         <p:nvPicPr>
-          <p:cNvPr id="164" name="Image" descr="Image"/>
+          <p:cNvPr id="167" name="Image" descr="Image"/>
           <p:cNvPicPr>
             <a:picLocks noChangeAspect="1"/>
           </p:cNvPicPr>
@@ -4265,8 +5309,8 @@
         </p:blipFill>
         <p:spPr>
           <a:xfrm>
-            <a:off x="4631069" y="5270499"/>
-            <a:ext cx="15121862" cy="3175001"/>
+            <a:off x="4631070" y="8001788"/>
+            <a:ext cx="15121860" cy="3175001"/>
           </a:xfrm>
           <a:prstGeom prst="rect">
             <a:avLst/>
@@ -4276,6 +5320,143 @@
           </a:ln>
         </p:spPr>
       </p:pic>
+      <p:sp>
+        <p:nvSpPr>
+          <p:cNvPr id="168" name="Serial передача"/>
+          <p:cNvSpPr txBox="1"/>
+          <p:nvPr/>
+        </p:nvSpPr>
+        <p:spPr>
+          <a:xfrm>
+            <a:off x="968236" y="869240"/>
+            <a:ext cx="8068057" cy="1378388"/>
+          </a:xfrm>
+          <a:prstGeom prst="rect">
+            <a:avLst/>
+          </a:prstGeom>
+          <a:ln w="12700">
+            <a:miter lim="400000"/>
+          </a:ln>
+          <a:extLst>
+            <a:ext uri="{C572A759-6A51-4108-AA02-DFA0A04FC94B}">
+              <ma14:wrappingTextBoxFlag xmlns:ma14="http://schemas.microsoft.com/office/mac/drawingml/2011/main" val="1"/>
+            </a:ext>
+          </a:extLst>
+        </p:spPr>
+        <p:txBody>
+          <a:bodyPr wrap="none" lIns="50800" tIns="50800" rIns="50800" bIns="50800" anchor="ctr">
+            <a:spAutoFit/>
+          </a:bodyPr>
+          <a:lstStyle>
+            <a:lvl1pPr algn="l">
+              <a:lnSpc>
+                <a:spcPct val="80000"/>
+              </a:lnSpc>
+              <a:defRPr b="1" spc="-170" sz="8500">
+                <a:solidFill>
+                  <a:srgbClr val="EFCF0A"/>
+                </a:solidFill>
+              </a:defRPr>
+            </a:lvl1pPr>
+          </a:lstStyle>
+          <a:p>
+            <a:pPr/>
+            <a:r>
+              <a:t>Serial передача</a:t>
+            </a:r>
+          </a:p>
+        </p:txBody>
+      </p:sp>
+      <p:sp>
+        <p:nvSpPr>
+          <p:cNvPr id="169" name="Може використовуватись на довгих відстанях…"/>
+          <p:cNvSpPr txBox="1"/>
+          <p:nvPr/>
+        </p:nvSpPr>
+        <p:spPr>
+          <a:xfrm>
+            <a:off x="956297" y="3238521"/>
+            <a:ext cx="14254583" cy="3257866"/>
+          </a:xfrm>
+          <a:prstGeom prst="rect">
+            <a:avLst/>
+          </a:prstGeom>
+          <a:ln w="12700">
+            <a:miter lim="400000"/>
+          </a:ln>
+          <a:extLst>
+            <a:ext uri="{C572A759-6A51-4108-AA02-DFA0A04FC94B}">
+              <ma14:wrappingTextBoxFlag xmlns:ma14="http://schemas.microsoft.com/office/mac/drawingml/2011/main" val="1"/>
+            </a:ext>
+          </a:extLst>
+        </p:spPr>
+        <p:txBody>
+          <a:bodyPr wrap="none" lIns="50800" tIns="50800" rIns="50800" bIns="50800" anchor="ctr">
+            <a:spAutoFit/>
+          </a:bodyPr>
+          <a:lstStyle/>
+          <a:p>
+            <a:pPr marL="609600" indent="-609600" algn="l">
+              <a:lnSpc>
+                <a:spcPct val="90000"/>
+              </a:lnSpc>
+              <a:spcBef>
+                <a:spcPts val="4500"/>
+              </a:spcBef>
+              <a:buSzPct val="123000"/>
+              <a:buChar char="•"/>
+              <a:defRPr sz="4800">
+                <a:solidFill>
+                  <a:srgbClr val="000000"/>
+                </a:solidFill>
+              </a:defRPr>
+            </a:pPr>
+            <a:r>
+              <a:t>Може використовуватись на довгих відстанях</a:t>
+            </a:r>
+          </a:p>
+          <a:p>
+            <a:pPr marL="609600" indent="-609600" algn="l">
+              <a:lnSpc>
+                <a:spcPct val="90000"/>
+              </a:lnSpc>
+              <a:spcBef>
+                <a:spcPts val="4500"/>
+              </a:spcBef>
+              <a:buSzPct val="123000"/>
+              <a:buChar char="•"/>
+              <a:defRPr sz="4800">
+                <a:solidFill>
+                  <a:srgbClr val="000000"/>
+                </a:solidFill>
+              </a:defRPr>
+            </a:pPr>
+            <a:r>
+              <a:t>Дозволяє комунікацію один-до-багатьох тощо.</a:t>
+            </a:r>
+          </a:p>
+          <a:p>
+            <a:pPr marL="609600" indent="-609600" algn="l">
+              <a:lnSpc>
+                <a:spcPct val="90000"/>
+              </a:lnSpc>
+              <a:spcBef>
+                <a:spcPts val="4500"/>
+              </a:spcBef>
+              <a:buSzPct val="123000"/>
+              <a:buChar char="•"/>
+              <a:defRPr sz="4800">
+                <a:solidFill>
+                  <a:srgbClr val="000000"/>
+                </a:solidFill>
+              </a:defRPr>
+            </a:pPr>
+            <a:r>
+              <a:t>Дешева та ефективна</a:t>
+            </a:r>
+          </a:p>
+        </p:txBody>
+      </p:sp>
     </p:spTree>
   </p:cSld>
   <p:clrMapOvr>
@@ -4304,14 +5485,14 @@
       </p:grpSpPr>
       <p:sp>
         <p:nvSpPr>
-          <p:cNvPr id="166" name="Asynchronous Serial Transmission"/>
+          <p:cNvPr id="171" name="Asynchronous Serial Transmission. UART"/>
           <p:cNvSpPr txBox="1"/>
           <p:nvPr/>
         </p:nvSpPr>
         <p:spPr>
           <a:xfrm>
-            <a:off x="754965" y="1200996"/>
-            <a:ext cx="17113187" cy="1378388"/>
+            <a:off x="754965" y="1200995"/>
+            <a:ext cx="20542759" cy="1378388"/>
           </a:xfrm>
           <a:prstGeom prst="rect">
             <a:avLst/>
@@ -4344,14 +5525,137 @@
           <a:p>
             <a:pPr/>
             <a:r>
-              <a:t>Asynchronous Serial Transmission</a:t>
+              <a:t>Asynchronous Serial Transmission. UART</a:t>
+            </a:r>
+          </a:p>
+        </p:txBody>
+      </p:sp>
+      <p:sp>
+        <p:nvSpPr>
+          <p:cNvPr id="172" name="кожна посилка складається із стартового біта, за яким слідують вісім біт даних (bits 0-7), і один стоп біт.…"/>
+          <p:cNvSpPr txBox="1"/>
+          <p:nvPr/>
+        </p:nvSpPr>
+        <p:spPr>
+          <a:xfrm>
+            <a:off x="912974" y="2792701"/>
+            <a:ext cx="22084115" cy="3992800"/>
+          </a:xfrm>
+          <a:prstGeom prst="rect">
+            <a:avLst/>
+          </a:prstGeom>
+          <a:ln w="12700">
+            <a:miter lim="400000"/>
+          </a:ln>
+          <a:extLst>
+            <a:ext uri="{C572A759-6A51-4108-AA02-DFA0A04FC94B}">
+              <ma14:wrappingTextBoxFlag xmlns:ma14="http://schemas.microsoft.com/office/mac/drawingml/2011/main" val="1"/>
+            </a:ext>
+          </a:extLst>
+        </p:spPr>
+        <p:txBody>
+          <a:bodyPr lIns="50800" tIns="50800" rIns="50800" bIns="50800" anchor="ctr">
+            <a:spAutoFit/>
+          </a:bodyPr>
+          <a:lstStyle/>
+          <a:p>
+            <a:pPr marL="609600" indent="-609600" algn="l">
+              <a:lnSpc>
+                <a:spcPct val="90000"/>
+              </a:lnSpc>
+              <a:spcBef>
+                <a:spcPts val="4500"/>
+              </a:spcBef>
+              <a:buSzPct val="123000"/>
+              <a:buChar char="•"/>
+              <a:defRPr sz="4800">
+                <a:solidFill>
+                  <a:srgbClr val="000000"/>
+                </a:solidFill>
+              </a:defRPr>
+            </a:pPr>
+            <a:r>
+              <a:t>кожна посилка складається із </a:t>
+            </a:r>
+            <a:r>
+              <a:rPr>
+                <a:solidFill>
+                  <a:srgbClr val="EFCF0A"/>
+                </a:solidFill>
+              </a:rPr>
+              <a:t>стартового біта</a:t>
+            </a:r>
+            <a:r>
+              <a:t>, за яким слідують вісім біт даних (bits 0-7), і один </a:t>
+            </a:r>
+            <a:r>
+              <a:rPr>
+                <a:solidFill>
+                  <a:srgbClr val="EFCF0A"/>
+                </a:solidFill>
+              </a:rPr>
+              <a:t>стоп біт</a:t>
+            </a:r>
+            <a:r>
+              <a:rPr>
+                <a:solidFill>
+                  <a:srgbClr val="0A0303"/>
+                </a:solidFill>
+              </a:rPr>
+              <a:t>.</a:t>
+            </a:r>
+            <a:endParaRPr>
+              <a:solidFill>
+                <a:srgbClr val="0A0303"/>
+              </a:solidFill>
+            </a:endParaRPr>
+          </a:p>
+          <a:p>
+            <a:pPr marL="609600" indent="-609600" algn="l">
+              <a:lnSpc>
+                <a:spcPct val="90000"/>
+              </a:lnSpc>
+              <a:spcBef>
+                <a:spcPts val="4500"/>
+              </a:spcBef>
+              <a:buSzPct val="123000"/>
+              <a:buChar char="•"/>
+              <a:defRPr sz="4800">
+                <a:solidFill>
+                  <a:srgbClr val="000000"/>
+                </a:solidFill>
+              </a:defRPr>
+            </a:pPr>
+            <a:r>
+              <a:rPr>
+                <a:solidFill>
+                  <a:srgbClr val="0A0303"/>
+                </a:solidFill>
+              </a:rPr>
+              <a:t>щоб знати, який проміжок між двома сигналами, два пристрої повинні домовитись про </a:t>
+            </a:r>
+            <a:r>
+              <a:rPr>
+                <a:solidFill>
+                  <a:srgbClr val="EFCF0A"/>
+                </a:solidFill>
+              </a:rPr>
+              <a:t>baud rate </a:t>
+            </a:r>
+            <a:r>
+              <a:rPr>
+                <a:solidFill>
+                  <a:srgbClr val="0A0303"/>
+                </a:solidFill>
+              </a:rPr>
+              <a:t>(В контексті Arduino, 9600 baud rate, означає, що система зможе переслати щонайбільше 9600 бітів).</a:t>
             </a:r>
           </a:p>
         </p:txBody>
       </p:sp>
       <p:pic>
         <p:nvPicPr>
-          <p:cNvPr id="167" name="Image" descr="Image"/>
+          <p:cNvPr id="173" name="UART-Transmission-frame.png.jpeg" descr="UART-Transmission-frame.png.jpeg"/>
           <p:cNvPicPr>
             <a:picLocks noChangeAspect="1"/>
           </p:cNvPicPr>
@@ -4367,8 +5671,37 @@
         </p:blipFill>
         <p:spPr>
           <a:xfrm>
-            <a:off x="4415108" y="4427721"/>
-            <a:ext cx="15553784" cy="4860558"/>
+            <a:off x="1932821" y="8207354"/>
+            <a:ext cx="13504107" cy="3771095"/>
+          </a:xfrm>
+          <a:prstGeom prst="rect">
+            <a:avLst/>
+          </a:prstGeom>
+          <a:ln w="12700">
+            <a:miter lim="400000"/>
+          </a:ln>
+        </p:spPr>
+      </p:pic>
+      <p:pic>
+        <p:nvPicPr>
+          <p:cNvPr id="174" name="first rx.jpg" descr="first rx.jpg"/>
+          <p:cNvPicPr>
+            <a:picLocks noChangeAspect="1"/>
+          </p:cNvPicPr>
+          <p:nvPr/>
+        </p:nvPicPr>
+        <p:blipFill>
+          <a:blip r:embed="rId3">
+            <a:extLst/>
+          </a:blip>
+          <a:stretch>
+            <a:fillRect/>
+          </a:stretch>
+        </p:blipFill>
+        <p:spPr>
+          <a:xfrm>
+            <a:off x="15936466" y="7431014"/>
+            <a:ext cx="8128001" cy="5956301"/>
           </a:xfrm>
           <a:prstGeom prst="rect">
             <a:avLst/>
@@ -4406,7 +5739,7 @@
       </p:grpSpPr>
       <p:pic>
         <p:nvPicPr>
-          <p:cNvPr id="169" name="Image" descr="Image"/>
+          <p:cNvPr id="176" name="uart2.GIF" descr="uart2.GIF"/>
           <p:cNvPicPr>
             <a:picLocks noChangeAspect="1"/>
           </p:cNvPicPr>
@@ -4422,27 +5755,30 @@
         </p:blipFill>
         <p:spPr>
           <a:xfrm>
-            <a:off x="4016754" y="5055440"/>
-            <a:ext cx="16350492" cy="3605120"/>
+            <a:off x="7908988" y="3446948"/>
+            <a:ext cx="5994401" cy="2324101"/>
           </a:xfrm>
           <a:prstGeom prst="rect">
             <a:avLst/>
           </a:prstGeom>
-          <a:ln w="12700">
+          <a:ln w="63500">
+            <a:solidFill>
+              <a:srgbClr val="000000"/>
+            </a:solidFill>
             <a:miter lim="400000"/>
           </a:ln>
         </p:spPr>
       </p:pic>
       <p:sp>
         <p:nvSpPr>
-          <p:cNvPr id="170" name="Synchronous Serial Transmission."/>
+          <p:cNvPr id="177" name="Найбільш поширений  та простий тип зв’язку між двома девайсами…"/>
           <p:cNvSpPr txBox="1"/>
           <p:nvPr/>
         </p:nvSpPr>
         <p:spPr>
           <a:xfrm>
-            <a:off x="754965" y="1200995"/>
-            <a:ext cx="16794735" cy="1378388"/>
+            <a:off x="858923" y="2230673"/>
+            <a:ext cx="22666154" cy="5135800"/>
           </a:xfrm>
           <a:prstGeom prst="rect">
             <a:avLst/>
@@ -4457,25 +5793,187 @@
           </a:extLst>
         </p:spPr>
         <p:txBody>
-          <a:bodyPr wrap="none" lIns="50800" tIns="50800" rIns="50800" bIns="50800" anchor="ctr">
+          <a:bodyPr lIns="50800" tIns="50800" rIns="50800" bIns="50800" anchor="ctr">
             <a:spAutoFit/>
           </a:bodyPr>
-          <a:lstStyle>
-            <a:lvl1pPr algn="l">
+          <a:lstStyle/>
+          <a:p>
+            <a:pPr marL="609600" indent="-609600" algn="l">
               <a:lnSpc>
-                <a:spcPct val="80000"/>
+                <a:spcPct val="90000"/>
               </a:lnSpc>
-              <a:defRPr b="1" spc="-170" sz="8500">
+              <a:spcBef>
+                <a:spcPts val="4500"/>
+              </a:spcBef>
+              <a:buSzPct val="123000"/>
+              <a:buChar char="•"/>
+              <a:defRPr sz="4800">
+                <a:solidFill>
+                  <a:srgbClr val="000000"/>
+                </a:solidFill>
+              </a:defRPr>
+            </a:pPr>
+            <a:r>
+              <a:t>Найбільш </a:t>
+            </a:r>
+            <a:r>
+              <a:rPr>
+                <a:solidFill>
+                  <a:srgbClr val="EFCF0A"/>
+                </a:solidFill>
+              </a:rPr>
+              <a:t>поширений</a:t>
+            </a:r>
+            <a:r>
+              <a:t>  та </a:t>
+            </a:r>
+            <a:r>
+              <a:rPr>
+                <a:solidFill>
+                  <a:srgbClr val="EFCF0A"/>
+                </a:solidFill>
+              </a:rPr>
+              <a:t>простий</a:t>
+            </a:r>
+            <a:r>
+              <a:t> тип зв’язку між двома девайсами</a:t>
+            </a:r>
+          </a:p>
+          <a:p>
+            <a:pPr marL="609600" indent="-609600" algn="l">
+              <a:lnSpc>
+                <a:spcPct val="90000"/>
+              </a:lnSpc>
+              <a:spcBef>
+                <a:spcPts val="4500"/>
+              </a:spcBef>
+              <a:buSzPct val="123000"/>
+              <a:buChar char="•"/>
+              <a:defRPr sz="4800">
                 <a:solidFill>
                   <a:srgbClr val="EFCF0A"/>
                 </a:solidFill>
               </a:defRPr>
-            </a:lvl1pPr>
-          </a:lstStyle>
-          <a:p>
-            <a:pPr/>
-            <a:r>
-              <a:t>Synchronous Serial Transmission.</a:t>
+            </a:pPr>
+            <a:r>
+              <a:t>Повільний</a:t>
+            </a:r>
+          </a:p>
+          <a:p>
+            <a:pPr marL="609600" indent="-609600" algn="l">
+              <a:lnSpc>
+                <a:spcPct val="90000"/>
+              </a:lnSpc>
+              <a:spcBef>
+                <a:spcPts val="4500"/>
+              </a:spcBef>
+              <a:buSzPct val="123000"/>
+              <a:buChar char="•"/>
+              <a:defRPr sz="4800">
+                <a:solidFill>
+                  <a:srgbClr val="000000"/>
+                </a:solidFill>
+              </a:defRPr>
+            </a:pPr>
+            <a:r>
+              <a:t>Схема підключення:</a:t>
+            </a:r>
+          </a:p>
+          <a:p>
+            <a:pPr marL="609600" indent="-609600" algn="l">
+              <a:lnSpc>
+                <a:spcPct val="90000"/>
+              </a:lnSpc>
+              <a:spcBef>
+                <a:spcPts val="4500"/>
+              </a:spcBef>
+              <a:buSzPct val="123000"/>
+              <a:buChar char="•"/>
+              <a:defRPr sz="4800">
+                <a:solidFill>
+                  <a:srgbClr val="000000"/>
+                </a:solidFill>
+              </a:defRPr>
+            </a:pPr>
+            <a:r>
+              <a:t>! Використовується зокрема при комунікації комп’ютера з мікроконтролером*</a:t>
+            </a:r>
+          </a:p>
+        </p:txBody>
+      </p:sp>
+      <p:pic>
+        <p:nvPicPr>
+          <p:cNvPr id="178" name="UART-Interface.png.png" descr="UART-Interface.png.png"/>
+          <p:cNvPicPr>
+            <a:picLocks noChangeAspect="1"/>
+          </p:cNvPicPr>
+          <p:nvPr/>
+        </p:nvPicPr>
+        <p:blipFill>
+          <a:blip r:embed="rId3">
+            <a:extLst/>
+          </a:blip>
+          <a:stretch>
+            <a:fillRect/>
+          </a:stretch>
+        </p:blipFill>
+        <p:spPr>
+          <a:xfrm>
+            <a:off x="7826967" y="8123612"/>
+            <a:ext cx="7620001" cy="3581401"/>
+          </a:xfrm>
+          <a:prstGeom prst="rect">
+            <a:avLst/>
+          </a:prstGeom>
+          <a:ln w="63500">
+            <a:solidFill>
+              <a:srgbClr val="000000"/>
+            </a:solidFill>
+            <a:miter lim="400000"/>
+          </a:ln>
+        </p:spPr>
+      </p:pic>
+      <p:sp>
+        <p:nvSpPr>
+          <p:cNvPr id="179" name="Через це можуть бути труднощі, якщо хотіти використовувати UART і прошивати мікроконтрлер через Serial Port водночас. Щоб вирішити цю проблему: https://www.arduino.cc/en/Reference/softwareSerial)"/>
+          <p:cNvSpPr txBox="1"/>
+          <p:nvPr/>
+        </p:nvSpPr>
+        <p:spPr>
+          <a:xfrm>
+            <a:off x="388684" y="12462152"/>
+            <a:ext cx="23207473" cy="829667"/>
+          </a:xfrm>
+          <a:prstGeom prst="rect">
+            <a:avLst/>
+          </a:prstGeom>
+          <a:ln w="12700">
+            <a:miter lim="400000"/>
+          </a:ln>
+          <a:extLst>
+            <a:ext uri="{C572A759-6A51-4108-AA02-DFA0A04FC94B}">
+              <ma14:wrappingTextBoxFlag xmlns:ma14="http://schemas.microsoft.com/office/mac/drawingml/2011/main" val="1"/>
+            </a:ext>
+          </a:extLst>
+        </p:spPr>
+        <p:txBody>
+          <a:bodyPr wrap="none" lIns="50800" tIns="50800" rIns="50800" bIns="50800" anchor="ctr">
+            <a:spAutoFit/>
+          </a:bodyPr>
+          <a:lstStyle/>
+          <a:p>
+            <a:pPr algn="l"/>
+            <a:r>
+              <a:t>Через це можуть бути труднощі, якщо хотіти використовувати UART і прошивати мікроконтрлер через Serial Port водночас. Щоб вирішити цю проблему: </a:t>
+            </a:r>
+            <a:r>
+              <a:rPr u="sng">
+                <a:hlinkClick r:id="rId4" invalidUrl="" action="" tgtFrame="" tooltip="" history="1" highlightClick="0" endSnd="0"/>
+              </a:rPr>
+              <a:t>https://www.arduino.cc/en/Reference/softwareSerial</a:t>
+            </a:r>
+            <a:r>
+              <a:t>)</a:t>
             </a:r>
           </a:p>
         </p:txBody>
@@ -4508,7 +6006,7 @@
       </p:grpSpPr>
       <p:pic>
         <p:nvPicPr>
-          <p:cNvPr id="172" name="Image" descr="Image"/>
+          <p:cNvPr id="181" name="unnamed.jpg" descr="unnamed.jpg"/>
           <p:cNvPicPr>
             <a:picLocks noChangeAspect="1"/>
           </p:cNvPicPr>
@@ -4524,8 +6022,8 @@
         </p:blipFill>
         <p:spPr>
           <a:xfrm>
-            <a:off x="7429500" y="3556000"/>
-            <a:ext cx="9525000" cy="6604000"/>
+            <a:off x="6432036" y="3764269"/>
+            <a:ext cx="11519928" cy="6187462"/>
           </a:xfrm>
           <a:prstGeom prst="rect">
             <a:avLst/>
@@ -4535,6 +6033,94 @@
           </a:ln>
         </p:spPr>
       </p:pic>
+      <p:sp>
+        <p:nvSpPr>
+          <p:cNvPr id="182" name="Приклад використання UART*"/>
+          <p:cNvSpPr txBox="1"/>
+          <p:nvPr/>
+        </p:nvSpPr>
+        <p:spPr>
+          <a:xfrm>
+            <a:off x="944539" y="1225309"/>
+            <a:ext cx="8748066" cy="808432"/>
+          </a:xfrm>
+          <a:prstGeom prst="rect">
+            <a:avLst/>
+          </a:prstGeom>
+          <a:ln w="12700">
+            <a:miter lim="400000"/>
+          </a:ln>
+          <a:extLst>
+            <a:ext uri="{C572A759-6A51-4108-AA02-DFA0A04FC94B}">
+              <ma14:wrappingTextBoxFlag xmlns:ma14="http://schemas.microsoft.com/office/mac/drawingml/2011/main" val="1"/>
+            </a:ext>
+          </a:extLst>
+        </p:spPr>
+        <p:txBody>
+          <a:bodyPr wrap="none" lIns="50800" tIns="50800" rIns="50800" bIns="50800" anchor="ctr">
+            <a:spAutoFit/>
+          </a:bodyPr>
+          <a:lstStyle>
+            <a:lvl1pPr algn="l">
+              <a:lnSpc>
+                <a:spcPct val="90000"/>
+              </a:lnSpc>
+              <a:spcBef>
+                <a:spcPts val="4500"/>
+              </a:spcBef>
+              <a:defRPr sz="4800">
+                <a:solidFill>
+                  <a:srgbClr val="EFCF0A"/>
+                </a:solidFill>
+              </a:defRPr>
+            </a:lvl1pPr>
+          </a:lstStyle>
+          <a:p>
+            <a:pPr/>
+            <a:r>
+              <a:t>Приклад використання UART*</a:t>
+            </a:r>
+          </a:p>
+        </p:txBody>
+      </p:sp>
+      <p:sp>
+        <p:nvSpPr>
+          <p:cNvPr id="183" name="Дещо навчальний, втім в реальному житті таке часто потрібне: для прикладу, використати ще один контролер з доступом до інтернету, на яких будуть приходити дані та які він відсилатиме на веб-сервер."/>
+          <p:cNvSpPr txBox="1"/>
+          <p:nvPr/>
+        </p:nvSpPr>
+        <p:spPr>
+          <a:xfrm>
+            <a:off x="389343" y="12257397"/>
+            <a:ext cx="17281245" cy="829667"/>
+          </a:xfrm>
+          <a:prstGeom prst="rect">
+            <a:avLst/>
+          </a:prstGeom>
+          <a:ln w="12700">
+            <a:miter lim="400000"/>
+          </a:ln>
+          <a:extLst>
+            <a:ext uri="{C572A759-6A51-4108-AA02-DFA0A04FC94B}">
+              <ma14:wrappingTextBoxFlag xmlns:ma14="http://schemas.microsoft.com/office/mac/drawingml/2011/main" val="1"/>
+            </a:ext>
+          </a:extLst>
+        </p:spPr>
+        <p:txBody>
+          <a:bodyPr lIns="50800" tIns="50800" rIns="50800" bIns="50800" anchor="ctr">
+            <a:spAutoFit/>
+          </a:bodyPr>
+          <a:lstStyle>
+            <a:lvl1pPr algn="l"/>
+          </a:lstStyle>
+          <a:p>
+            <a:pPr/>
+            <a:r>
+              <a:t>Дещо навчальний, втім в реальному житті таке часто потрібне: для прикладу, використати ще один контролер з доступом до інтернету, на яких будуть приходити дані та які він відсилатиме на веб-сервер.</a:t>
+            </a:r>
+          </a:p>
+        </p:txBody>
+      </p:sp>
     </p:spTree>
   </p:cSld>
   <p:clrMapOvr>
@@ -4561,45 +6147,16 @@
           <a:chExt cx="0" cy="0"/>
         </a:xfrm>
       </p:grpSpPr>
-      <p:pic>
-        <p:nvPicPr>
-          <p:cNvPr id="174" name="Screenshot 2021-07-29 at 13.09.04.png" descr="Screenshot 2021-07-29 at 13.09.04.png"/>
-          <p:cNvPicPr>
-            <a:picLocks noChangeAspect="1"/>
-          </p:cNvPicPr>
-          <p:nvPr/>
-        </p:nvPicPr>
-        <p:blipFill>
-          <a:blip r:embed="rId2">
-            <a:extLst/>
-          </a:blip>
-          <a:stretch>
-            <a:fillRect/>
-          </a:stretch>
-        </p:blipFill>
-        <p:spPr>
-          <a:xfrm>
-            <a:off x="981915" y="5023892"/>
-            <a:ext cx="15642887" cy="5374385"/>
-          </a:xfrm>
-          <a:prstGeom prst="rect">
-            <a:avLst/>
-          </a:prstGeom>
-          <a:ln w="12700">
-            <a:miter lim="400000"/>
-          </a:ln>
-        </p:spPr>
-      </p:pic>
       <p:sp>
         <p:nvSpPr>
-          <p:cNvPr id="175" name="analogRead()"/>
+          <p:cNvPr id="185" name="Synchronous Serial Transmission."/>
           <p:cNvSpPr txBox="1"/>
           <p:nvPr/>
         </p:nvSpPr>
         <p:spPr>
           <a:xfrm>
-            <a:off x="920842" y="916634"/>
-            <a:ext cx="6649594" cy="1378388"/>
+            <a:off x="754965" y="1200995"/>
+            <a:ext cx="16794735" cy="1378388"/>
           </a:xfrm>
           <a:prstGeom prst="rect">
             <a:avLst/>
@@ -4632,14 +6189,300 @@
           <a:p>
             <a:pPr/>
             <a:r>
-              <a:t>analogRead()</a:t>
+              <a:t>Synchronous Serial Transmission.</a:t>
             </a:r>
           </a:p>
         </p:txBody>
       </p:sp>
+      <p:sp>
+        <p:nvSpPr>
+          <p:cNvPr id="186" name="Безперервний потік сигналів даних супроводжується сигналами синхронізації (генерованими clock-ом для забезпечення того, щоб передавач і приймач були синхронізовані)."/>
+          <p:cNvSpPr txBox="1"/>
+          <p:nvPr/>
+        </p:nvSpPr>
+        <p:spPr>
+          <a:xfrm>
+            <a:off x="852151" y="2885862"/>
+            <a:ext cx="23030384" cy="2114866"/>
+          </a:xfrm>
+          <a:prstGeom prst="rect">
+            <a:avLst/>
+          </a:prstGeom>
+          <a:ln w="12700">
+            <a:miter lim="400000"/>
+          </a:ln>
+          <a:extLst>
+            <a:ext uri="{C572A759-6A51-4108-AA02-DFA0A04FC94B}">
+              <ma14:wrappingTextBoxFlag xmlns:ma14="http://schemas.microsoft.com/office/mac/drawingml/2011/main" val="1"/>
+            </a:ext>
+          </a:extLst>
+        </p:spPr>
+        <p:txBody>
+          <a:bodyPr wrap="none" lIns="50800" tIns="50800" rIns="50800" bIns="50800" anchor="ctr">
+            <a:spAutoFit/>
+          </a:bodyPr>
+          <a:lstStyle>
+            <a:lvl1pPr algn="l">
+              <a:lnSpc>
+                <a:spcPct val="90000"/>
+              </a:lnSpc>
+              <a:spcBef>
+                <a:spcPts val="4500"/>
+              </a:spcBef>
+              <a:defRPr sz="4800">
+                <a:solidFill>
+                  <a:srgbClr val="000000"/>
+                </a:solidFill>
+              </a:defRPr>
+            </a:lvl1pPr>
+          </a:lstStyle>
+          <a:p>
+            <a:pPr/>
+            <a:r>
+              <a:t>Безперервний потік сигналів даних супроводжується сигналами синхронізації (генерованими clock-ом для забезпечення того, щоб передавач і приймач були синхронізовані).</a:t>
+            </a:r>
+          </a:p>
+        </p:txBody>
+      </p:sp>
+      <p:grpSp>
+        <p:nvGrpSpPr>
+          <p:cNvPr id="189" name="Group"/>
+          <p:cNvGrpSpPr/>
+          <p:nvPr/>
+        </p:nvGrpSpPr>
+        <p:grpSpPr>
+          <a:xfrm>
+            <a:off x="1467554" y="6091556"/>
+            <a:ext cx="9647889" cy="6753228"/>
+            <a:chOff x="0" y="0"/>
+            <a:chExt cx="9647887" cy="6753226"/>
+          </a:xfrm>
+        </p:grpSpPr>
+        <p:pic>
+          <p:nvPicPr>
+            <p:cNvPr id="187" name="Image" descr="Image"/>
+            <p:cNvPicPr>
+              <a:picLocks noChangeAspect="1"/>
+            </p:cNvPicPr>
+            <p:nvPr/>
+          </p:nvPicPr>
+          <p:blipFill>
+            <a:blip r:embed="rId2">
+              <a:extLst/>
+            </a:blip>
+            <a:stretch>
+              <a:fillRect/>
+            </a:stretch>
+          </p:blipFill>
+          <p:spPr>
+            <a:xfrm>
+              <a:off x="61443" y="0"/>
+              <a:ext cx="9525001" cy="6604000"/>
+            </a:xfrm>
+            <a:prstGeom prst="rect">
+              <a:avLst/>
+            </a:prstGeom>
+            <a:ln w="12700" cap="flat">
+              <a:noFill/>
+              <a:miter lim="400000"/>
+            </a:ln>
+            <a:effectLst/>
+          </p:spPr>
+        </p:pic>
+        <p:sp>
+          <p:nvSpPr>
+            <p:cNvPr id="188" name="Rectangle"/>
+            <p:cNvSpPr/>
+            <p:nvPr/>
+          </p:nvSpPr>
+          <p:spPr>
+            <a:xfrm>
+              <a:off x="0" y="4799711"/>
+              <a:ext cx="9647888" cy="1953516"/>
+            </a:xfrm>
+            <a:prstGeom prst="rect">
+              <a:avLst/>
+            </a:prstGeom>
+            <a:solidFill>
+              <a:srgbClr val="FDFEFD"/>
+            </a:solidFill>
+            <a:ln w="12700" cap="flat">
+              <a:noFill/>
+              <a:miter lim="400000"/>
+            </a:ln>
+            <a:effectLst/>
+          </p:spPr>
+          <p:txBody>
+            <a:bodyPr wrap="square" lIns="50800" tIns="50800" rIns="50800" bIns="50800" numCol="1" anchor="ctr">
+              <a:noAutofit/>
+            </a:bodyPr>
+            <a:lstStyle/>
+            <a:p>
+              <a:pPr defTabSz="825500">
+                <a:defRPr sz="3200">
+                  <a:solidFill>
+                    <a:srgbClr val="FFFFFF"/>
+                  </a:solidFill>
+                  <a:latin typeface="Helvetica Neue Medium"/>
+                  <a:ea typeface="Helvetica Neue Medium"/>
+                  <a:cs typeface="Helvetica Neue Medium"/>
+                  <a:sym typeface="Helvetica Neue Medium"/>
+                </a:defRPr>
+              </a:pPr>
+            </a:p>
+          </p:txBody>
+        </p:sp>
+      </p:grpSp>
+      <p:grpSp>
+        <p:nvGrpSpPr>
+          <p:cNvPr id="192" name="Group"/>
+          <p:cNvGrpSpPr/>
+          <p:nvPr/>
+        </p:nvGrpSpPr>
+        <p:grpSpPr>
+          <a:xfrm>
+            <a:off x="11797578" y="6841293"/>
+            <a:ext cx="10699829" cy="4798646"/>
+            <a:chOff x="0" y="0"/>
+            <a:chExt cx="10699828" cy="4798645"/>
+          </a:xfrm>
+        </p:grpSpPr>
+        <p:pic>
+          <p:nvPicPr>
+            <p:cNvPr id="190" name="Image" descr="Image"/>
+            <p:cNvPicPr>
+              <a:picLocks noChangeAspect="1"/>
+            </p:cNvPicPr>
+            <p:nvPr/>
+          </p:nvPicPr>
+          <p:blipFill>
+            <a:blip r:embed="rId3">
+              <a:extLst/>
+            </a:blip>
+            <a:stretch>
+              <a:fillRect/>
+            </a:stretch>
+          </p:blipFill>
+          <p:spPr>
+            <a:xfrm>
+              <a:off x="0" y="0"/>
+              <a:ext cx="10699829" cy="4647401"/>
+            </a:xfrm>
+            <a:prstGeom prst="rect">
+              <a:avLst/>
+            </a:prstGeom>
+            <a:ln w="63500" cap="flat">
+              <a:solidFill>
+                <a:srgbClr val="FFFFFF"/>
+              </a:solidFill>
+              <a:prstDash val="solid"/>
+              <a:miter lim="400000"/>
+            </a:ln>
+            <a:effectLst/>
+          </p:spPr>
+        </p:pic>
+        <p:sp>
+          <p:nvSpPr>
+            <p:cNvPr id="191" name="Rectangle"/>
+            <p:cNvSpPr/>
+            <p:nvPr/>
+          </p:nvSpPr>
+          <p:spPr>
+            <a:xfrm>
+              <a:off x="1418197" y="3528645"/>
+              <a:ext cx="8051788" cy="1270001"/>
+            </a:xfrm>
+            <a:prstGeom prst="rect">
+              <a:avLst/>
+            </a:prstGeom>
+            <a:solidFill>
+              <a:srgbClr val="FEFEFE"/>
+            </a:solidFill>
+            <a:ln w="12700" cap="flat">
+              <a:noFill/>
+              <a:miter lim="400000"/>
+            </a:ln>
+            <a:effectLst/>
+          </p:spPr>
+          <p:txBody>
+            <a:bodyPr wrap="square" lIns="50800" tIns="50800" rIns="50800" bIns="50800" numCol="1" anchor="ctr">
+              <a:noAutofit/>
+            </a:bodyPr>
+            <a:lstStyle/>
+            <a:p>
+              <a:pPr defTabSz="825500">
+                <a:defRPr sz="3200">
+                  <a:solidFill>
+                    <a:srgbClr val="FFFFFF"/>
+                  </a:solidFill>
+                  <a:latin typeface="Helvetica Neue Medium"/>
+                  <a:ea typeface="Helvetica Neue Medium"/>
+                  <a:cs typeface="Helvetica Neue Medium"/>
+                  <a:sym typeface="Helvetica Neue Medium"/>
+                </a:defRPr>
+              </a:pPr>
+            </a:p>
+          </p:txBody>
+        </p:sp>
+      </p:grpSp>
+    </p:spTree>
+  </p:cSld>
+  <p:clrMapOvr>
+    <a:masterClrMapping/>
+  </p:clrMapOvr>
+  <p:transition xmlns:p14="http://schemas.microsoft.com/office/powerpoint/2010/main" spd="med" advClick="1"/>
+</p:sld>
+</file>
+
+<file path=ppt/slides/slide9.xml><?xml version="1.0" encoding="utf-8"?>
+<p:sld xmlns:a="http://schemas.openxmlformats.org/drawingml/2006/main" xmlns:r="http://schemas.openxmlformats.org/officeDocument/2006/relationships" xmlns:p="http://schemas.openxmlformats.org/presentationml/2006/main" xmlns:m="http://schemas.openxmlformats.org/officeDocument/2006/math" xmlns:a14="http://schemas.microsoft.com/office/drawing/2010/main" showMasterSp="1" showMasterPhAnim="1">
+  <p:cSld>
+    <p:spTree>
+      <p:nvGrpSpPr>
+        <p:cNvPr id="1" name=""/>
+        <p:cNvGrpSpPr/>
+        <p:nvPr/>
+      </p:nvGrpSpPr>
+      <p:grpSpPr>
+        <a:xfrm>
+          <a:off x="0" y="0"/>
+          <a:ext cx="0" cy="0"/>
+          <a:chOff x="0" y="0"/>
+          <a:chExt cx="0" cy="0"/>
+        </a:xfrm>
+      </p:grpSpPr>
       <p:pic>
         <p:nvPicPr>
-          <p:cNvPr id="176" name="Screenshot 2021-07-29 at 13.10.09.png" descr="Screenshot 2021-07-29 at 13.10.09.png"/>
+          <p:cNvPr id="194" name="I2C_Basic_Address_and_Data_Frames.jpg" descr="I2C_Basic_Address_and_Data_Frames.jpg"/>
+          <p:cNvPicPr>
+            <a:picLocks noChangeAspect="1"/>
+          </p:cNvPicPr>
+          <p:nvPr/>
+        </p:nvPicPr>
+        <p:blipFill>
+          <a:blip r:embed="rId2">
+            <a:extLst/>
+          </a:blip>
+          <a:stretch>
+            <a:fillRect/>
+          </a:stretch>
+        </p:blipFill>
+        <p:spPr>
+          <a:xfrm>
+            <a:off x="1162010" y="8295135"/>
+            <a:ext cx="22059980" cy="4926729"/>
+          </a:xfrm>
+          <a:prstGeom prst="rect">
+            <a:avLst/>
+          </a:prstGeom>
+          <a:ln w="12700">
+            <a:miter lim="400000"/>
+          </a:ln>
+        </p:spPr>
+      </p:pic>
+      <p:pic>
+        <p:nvPicPr>
+          <p:cNvPr id="195" name="Image" descr="Image"/>
           <p:cNvPicPr>
             <a:picLocks noChangeAspect="1"/>
           </p:cNvPicPr>
@@ -4655,8 +6498,8 @@
         </p:blipFill>
         <p:spPr>
           <a:xfrm>
-            <a:off x="946090" y="2427424"/>
-            <a:ext cx="17837249" cy="1610982"/>
+            <a:off x="11775540" y="5331"/>
+            <a:ext cx="12617106" cy="5409455"/>
           </a:xfrm>
           <a:prstGeom prst="rect">
             <a:avLst/>
@@ -4666,6 +6509,247 @@
           </a:ln>
         </p:spPr>
       </p:pic>
+      <p:sp>
+        <p:nvSpPr>
+          <p:cNvPr id="196" name="I2C"/>
+          <p:cNvSpPr txBox="1"/>
+          <p:nvPr/>
+        </p:nvSpPr>
+        <p:spPr>
+          <a:xfrm>
+            <a:off x="912326" y="884421"/>
+            <a:ext cx="1768095" cy="1378388"/>
+          </a:xfrm>
+          <a:prstGeom prst="rect">
+            <a:avLst/>
+          </a:prstGeom>
+          <a:ln w="12700">
+            <a:miter lim="400000"/>
+          </a:ln>
+          <a:extLst>
+            <a:ext uri="{C572A759-6A51-4108-AA02-DFA0A04FC94B}">
+              <ma14:wrappingTextBoxFlag xmlns:ma14="http://schemas.microsoft.com/office/mac/drawingml/2011/main" val="1"/>
+            </a:ext>
+          </a:extLst>
+        </p:spPr>
+        <p:txBody>
+          <a:bodyPr wrap="none" lIns="50800" tIns="50800" rIns="50800" bIns="50800" anchor="ctr">
+            <a:spAutoFit/>
+          </a:bodyPr>
+          <a:lstStyle>
+            <a:lvl1pPr algn="l">
+              <a:lnSpc>
+                <a:spcPct val="80000"/>
+              </a:lnSpc>
+              <a:defRPr b="1" spc="-170" sz="8500">
+                <a:solidFill>
+                  <a:srgbClr val="EFCF0A"/>
+                </a:solidFill>
+              </a:defRPr>
+            </a:lvl1pPr>
+          </a:lstStyle>
+          <a:p>
+            <a:pPr/>
+            <a:r>
+              <a:t>I2C</a:t>
+            </a:r>
+          </a:p>
+        </p:txBody>
+      </p:sp>
+      <p:sp>
+        <p:nvSpPr>
+          <p:cNvPr id="197" name="складається з двох сигналів: SCL і SDA. SCL - тактовий сигнал, а SDA - сигнал даних.…"/>
+          <p:cNvSpPr txBox="1"/>
+          <p:nvPr/>
+        </p:nvSpPr>
+        <p:spPr>
+          <a:xfrm>
+            <a:off x="864933" y="2617572"/>
+            <a:ext cx="10460603" cy="3314955"/>
+          </a:xfrm>
+          <a:prstGeom prst="rect">
+            <a:avLst/>
+          </a:prstGeom>
+          <a:ln w="12700">
+            <a:miter lim="400000"/>
+          </a:ln>
+          <a:extLst>
+            <a:ext uri="{C572A759-6A51-4108-AA02-DFA0A04FC94B}">
+              <ma14:wrappingTextBoxFlag xmlns:ma14="http://schemas.microsoft.com/office/mac/drawingml/2011/main" val="1"/>
+            </a:ext>
+          </a:extLst>
+        </p:spPr>
+        <p:txBody>
+          <a:bodyPr lIns="50800" tIns="50800" rIns="50800" bIns="50800" anchor="ctr">
+            <a:spAutoFit/>
+          </a:bodyPr>
+          <a:lstStyle/>
+          <a:p>
+            <a:pPr marL="609600" indent="-609600" algn="l">
+              <a:spcBef>
+                <a:spcPts val="4500"/>
+              </a:spcBef>
+              <a:buSzPct val="123000"/>
+              <a:buChar char="•"/>
+              <a:defRPr sz="3500">
+                <a:solidFill>
+                  <a:srgbClr val="000000"/>
+                </a:solidFill>
+              </a:defRPr>
+            </a:pPr>
+            <a:r>
+              <a:t>складається з двох сигналів: </a:t>
+            </a:r>
+            <a:r>
+              <a:rPr>
+                <a:solidFill>
+                  <a:srgbClr val="EFCF0A"/>
+                </a:solidFill>
+              </a:rPr>
+              <a:t>SCL</a:t>
+            </a:r>
+            <a:r>
+              <a:t> і </a:t>
+            </a:r>
+            <a:r>
+              <a:rPr>
+                <a:solidFill>
+                  <a:srgbClr val="EFCF0A"/>
+                </a:solidFill>
+              </a:rPr>
+              <a:t>SDA</a:t>
+            </a:r>
+            <a:r>
+              <a:t>. SCL - тактовий сигнал, а SDA - сигнал даних.</a:t>
+            </a:r>
+          </a:p>
+          <a:p>
+            <a:pPr marL="609600" indent="-609600" algn="l">
+              <a:spcBef>
+                <a:spcPts val="4500"/>
+              </a:spcBef>
+              <a:buSzPct val="123000"/>
+              <a:buChar char="•"/>
+              <a:defRPr sz="3500">
+                <a:solidFill>
+                  <a:srgbClr val="000000"/>
+                </a:solidFill>
+              </a:defRPr>
+            </a:pPr>
+            <a:r>
+              <a:t>SCL завжди генерується Master-ом.</a:t>
+            </a:r>
+          </a:p>
+          <a:p>
+            <a:pPr marL="609600" indent="-609600" algn="l">
+              <a:spcBef>
+                <a:spcPts val="4500"/>
+              </a:spcBef>
+              <a:buSzPct val="123000"/>
+              <a:buChar char="•"/>
+              <a:defRPr sz="3500">
+                <a:solidFill>
+                  <a:srgbClr val="000000"/>
+                </a:solidFill>
+              </a:defRPr>
+            </a:pPr>
+            <a:r>
+              <a:t>Master також завжди ініціалізовує обмін.</a:t>
+            </a:r>
+          </a:p>
+        </p:txBody>
+      </p:sp>
+      <p:sp>
+        <p:nvSpPr>
+          <p:cNvPr id="198" name="На лінії даних SDA він виставляє адресу пристрою, з яким необхідно встановити зв’язок (може підключити до 127 пристроїв з різними! адресами). Наступний біт посилки - це код операції (читання або запис) і ще один біт - біт підтвердження (ACK)"/>
+          <p:cNvSpPr txBox="1"/>
+          <p:nvPr/>
+        </p:nvSpPr>
+        <p:spPr>
+          <a:xfrm>
+            <a:off x="1118453" y="6574360"/>
+            <a:ext cx="22147094" cy="1651255"/>
+          </a:xfrm>
+          <a:prstGeom prst="rect">
+            <a:avLst/>
+          </a:prstGeom>
+          <a:ln w="12700">
+            <a:miter lim="400000"/>
+          </a:ln>
+          <a:extLst>
+            <a:ext uri="{C572A759-6A51-4108-AA02-DFA0A04FC94B}">
+              <ma14:wrappingTextBoxFlag xmlns:ma14="http://schemas.microsoft.com/office/mac/drawingml/2011/main" val="1"/>
+            </a:ext>
+          </a:extLst>
+        </p:spPr>
+        <p:txBody>
+          <a:bodyPr lIns="50800" tIns="50800" rIns="50800" bIns="50800" anchor="ctr">
+            <a:spAutoFit/>
+          </a:bodyPr>
+          <a:lstStyle/>
+          <a:p>
+            <a:pPr lvl="1" marL="1219200" indent="-609600" algn="l">
+              <a:spcBef>
+                <a:spcPts val="4500"/>
+              </a:spcBef>
+              <a:buSzPct val="123000"/>
+              <a:buChar char="•"/>
+              <a:defRPr sz="3500">
+                <a:solidFill>
+                  <a:srgbClr val="000000"/>
+                </a:solidFill>
+              </a:defRPr>
+            </a:pPr>
+            <a:r>
+              <a:t>На лінії даних SDA він виставляє </a:t>
+            </a:r>
+            <a:r>
+              <a:rPr>
+                <a:solidFill>
+                  <a:srgbClr val="EFCF0A"/>
+                </a:solidFill>
+              </a:rPr>
+              <a:t>адресу пристрою</a:t>
+            </a:r>
+            <a:r>
+              <a:t>, з яким необхідно встановити зв’язок (може підключити до </a:t>
+            </a:r>
+            <a:r>
+              <a:rPr>
+                <a:solidFill>
+                  <a:srgbClr val="EFCF0A"/>
+                </a:solidFill>
+              </a:rPr>
+              <a:t>127</a:t>
+            </a:r>
+            <a:r>
+              <a:t> пристроїв з різними! адресами). Наступний біт посилки - це </a:t>
+            </a:r>
+            <a:r>
+              <a:rPr>
+                <a:solidFill>
+                  <a:srgbClr val="EFCF0A"/>
+                </a:solidFill>
+              </a:rPr>
+              <a:t>код операції</a:t>
+            </a:r>
+            <a:r>
+              <a:t> (читання або запис) і ще один біт - </a:t>
+            </a:r>
+            <a:r>
+              <a:rPr>
+                <a:solidFill>
+                  <a:srgbClr val="EFCF0A"/>
+                </a:solidFill>
+              </a:rPr>
+              <a:t>біт підтвердження </a:t>
+            </a:r>
+            <a:r>
+              <a:t>(ACK)</a:t>
+            </a:r>
+          </a:p>
+        </p:txBody>
+      </p:sp>
     </p:spTree>
   </p:cSld>
   <p:clrMapOvr>

</xml_diff>